<commit_message>
update date 2 with IHC image examples
</commit_message>
<xml_diff>
--- a/day_2/day_2.pptx
+++ b/day_2/day_2.pptx
@@ -7,6 +7,13 @@
   <p:sldIdLst>
     <p:sldId id="264" r:id="rId2"/>
     <p:sldId id="260" r:id="rId3"/>
+    <p:sldId id="265" r:id="rId4"/>
+    <p:sldId id="266" r:id="rId5"/>
+    <p:sldId id="267" r:id="rId6"/>
+    <p:sldId id="268" r:id="rId7"/>
+    <p:sldId id="269" r:id="rId8"/>
+    <p:sldId id="278" r:id="rId9"/>
+    <p:sldId id="270" r:id="rId10"/>
   </p:sldIdLst>
   <p:sldSz cx="12192000" cy="6858000"/>
   <p:notesSz cx="6858000" cy="9144000"/>
@@ -260,7 +267,7 @@
           <a:p>
             <a:fld id="{B379E729-857E-4B18-8CDF-E57BD210DF26}" type="datetimeFigureOut">
               <a:rPr lang="en-US" smtClean="0"/>
-              <a:t>10/10/23</a:t>
+              <a:t>10/22/23</a:t>
             </a:fld>
             <a:endParaRPr lang="en-US"/>
           </a:p>
@@ -458,7 +465,7 @@
           <a:p>
             <a:fld id="{B379E729-857E-4B18-8CDF-E57BD210DF26}" type="datetimeFigureOut">
               <a:rPr lang="en-US" smtClean="0"/>
-              <a:t>10/10/23</a:t>
+              <a:t>10/22/23</a:t>
             </a:fld>
             <a:endParaRPr lang="en-US"/>
           </a:p>
@@ -666,7 +673,7 @@
           <a:p>
             <a:fld id="{B379E729-857E-4B18-8CDF-E57BD210DF26}" type="datetimeFigureOut">
               <a:rPr lang="en-US" smtClean="0"/>
-              <a:t>10/10/23</a:t>
+              <a:t>10/22/23</a:t>
             </a:fld>
             <a:endParaRPr lang="en-US"/>
           </a:p>
@@ -864,7 +871,7 @@
           <a:p>
             <a:fld id="{B379E729-857E-4B18-8CDF-E57BD210DF26}" type="datetimeFigureOut">
               <a:rPr lang="en-US" smtClean="0"/>
-              <a:t>10/10/23</a:t>
+              <a:t>10/22/23</a:t>
             </a:fld>
             <a:endParaRPr lang="en-US"/>
           </a:p>
@@ -1139,7 +1146,7 @@
           <a:p>
             <a:fld id="{B379E729-857E-4B18-8CDF-E57BD210DF26}" type="datetimeFigureOut">
               <a:rPr lang="en-US" smtClean="0"/>
-              <a:t>10/10/23</a:t>
+              <a:t>10/22/23</a:t>
             </a:fld>
             <a:endParaRPr lang="en-US"/>
           </a:p>
@@ -1404,7 +1411,7 @@
           <a:p>
             <a:fld id="{B379E729-857E-4B18-8CDF-E57BD210DF26}" type="datetimeFigureOut">
               <a:rPr lang="en-US" smtClean="0"/>
-              <a:t>10/10/23</a:t>
+              <a:t>10/22/23</a:t>
             </a:fld>
             <a:endParaRPr lang="en-US"/>
           </a:p>
@@ -1816,7 +1823,7 @@
           <a:p>
             <a:fld id="{B379E729-857E-4B18-8CDF-E57BD210DF26}" type="datetimeFigureOut">
               <a:rPr lang="en-US" smtClean="0"/>
-              <a:t>10/10/23</a:t>
+              <a:t>10/22/23</a:t>
             </a:fld>
             <a:endParaRPr lang="en-US"/>
           </a:p>
@@ -1957,7 +1964,7 @@
           <a:p>
             <a:fld id="{B379E729-857E-4B18-8CDF-E57BD210DF26}" type="datetimeFigureOut">
               <a:rPr lang="en-US" smtClean="0"/>
-              <a:t>10/10/23</a:t>
+              <a:t>10/22/23</a:t>
             </a:fld>
             <a:endParaRPr lang="en-US"/>
           </a:p>
@@ -2070,7 +2077,7 @@
           <a:p>
             <a:fld id="{B379E729-857E-4B18-8CDF-E57BD210DF26}" type="datetimeFigureOut">
               <a:rPr lang="en-US" smtClean="0"/>
-              <a:t>10/10/23</a:t>
+              <a:t>10/22/23</a:t>
             </a:fld>
             <a:endParaRPr lang="en-US"/>
           </a:p>
@@ -2381,7 +2388,7 @@
           <a:p>
             <a:fld id="{B379E729-857E-4B18-8CDF-E57BD210DF26}" type="datetimeFigureOut">
               <a:rPr lang="en-US" smtClean="0"/>
-              <a:t>10/10/23</a:t>
+              <a:t>10/22/23</a:t>
             </a:fld>
             <a:endParaRPr lang="en-US"/>
           </a:p>
@@ -2669,7 +2676,7 @@
           <a:p>
             <a:fld id="{B379E729-857E-4B18-8CDF-E57BD210DF26}" type="datetimeFigureOut">
               <a:rPr lang="en-US" smtClean="0"/>
-              <a:t>10/10/23</a:t>
+              <a:t>10/22/23</a:t>
             </a:fld>
             <a:endParaRPr lang="en-US"/>
           </a:p>
@@ -2910,7 +2917,7 @@
           <a:p>
             <a:fld id="{B379E729-857E-4B18-8CDF-E57BD210DF26}" type="datetimeFigureOut">
               <a:rPr lang="en-US" smtClean="0"/>
-              <a:t>10/10/23</a:t>
+              <a:t>10/22/23</a:t>
             </a:fld>
             <a:endParaRPr lang="en-US"/>
           </a:p>
@@ -3536,6 +3543,1863 @@
 </p:sld>
 </file>
 
+<file path=ppt/slides/slide3.xml><?xml version="1.0" encoding="utf-8"?>
+<p:sld xmlns:a="http://schemas.openxmlformats.org/drawingml/2006/main" xmlns:r="http://schemas.openxmlformats.org/officeDocument/2006/relationships" xmlns:p="http://schemas.openxmlformats.org/presentationml/2006/main">
+  <p:cSld>
+    <p:spTree>
+      <p:nvGrpSpPr>
+        <p:cNvPr id="1" name=""/>
+        <p:cNvGrpSpPr/>
+        <p:nvPr/>
+      </p:nvGrpSpPr>
+      <p:grpSpPr>
+        <a:xfrm>
+          <a:off x="0" y="0"/>
+          <a:ext cx="0" cy="0"/>
+          <a:chOff x="0" y="0"/>
+          <a:chExt cx="0" cy="0"/>
+        </a:xfrm>
+      </p:grpSpPr>
+      <p:sp>
+        <p:nvSpPr>
+          <p:cNvPr id="2" name="Title 1">
+            <a:extLst>
+              <a:ext uri="{FF2B5EF4-FFF2-40B4-BE49-F238E27FC236}">
+                <a16:creationId xmlns:a16="http://schemas.microsoft.com/office/drawing/2014/main" id="{81B67DA1-80A5-794A-9071-B8CFB623803D}"/>
+              </a:ext>
+            </a:extLst>
+          </p:cNvPr>
+          <p:cNvSpPr>
+            <a:spLocks noGrp="1"/>
+          </p:cNvSpPr>
+          <p:nvPr>
+            <p:ph type="title"/>
+          </p:nvPr>
+        </p:nvSpPr>
+        <p:spPr/>
+        <p:txBody>
+          <a:bodyPr/>
+          <a:lstStyle/>
+          <a:p>
+            <a:r>
+              <a:rPr lang="en-US" dirty="0"/>
+              <a:t>Biomedical Image Processing</a:t>
+            </a:r>
+          </a:p>
+        </p:txBody>
+      </p:sp>
+      <p:sp>
+        <p:nvSpPr>
+          <p:cNvPr id="9" name="Content Placeholder 8">
+            <a:extLst>
+              <a:ext uri="{FF2B5EF4-FFF2-40B4-BE49-F238E27FC236}">
+                <a16:creationId xmlns:a16="http://schemas.microsoft.com/office/drawing/2014/main" id="{CF0F0421-C68A-47D9-F673-3DD1397CED18}"/>
+              </a:ext>
+            </a:extLst>
+          </p:cNvPr>
+          <p:cNvSpPr>
+            <a:spLocks noGrp="1"/>
+          </p:cNvSpPr>
+          <p:nvPr>
+            <p:ph idx="1"/>
+          </p:nvPr>
+        </p:nvSpPr>
+        <p:spPr>
+          <a:xfrm>
+            <a:off x="838200" y="6358823"/>
+            <a:ext cx="10515600" cy="499177"/>
+          </a:xfrm>
+        </p:spPr>
+        <p:txBody>
+          <a:bodyPr>
+            <a:normAutofit/>
+          </a:bodyPr>
+          <a:lstStyle/>
+          <a:p>
+            <a:pPr marL="0" indent="0">
+              <a:buNone/>
+            </a:pPr>
+            <a:r>
+              <a:rPr lang="en-US" sz="1200" dirty="0"/>
+              <a:t>Source: https://</a:t>
+            </a:r>
+            <a:r>
+              <a:rPr lang="en-US" sz="1200" dirty="0" err="1"/>
+              <a:t>dair-ai.notion.site</a:t>
+            </a:r>
+            <a:r>
+              <a:rPr lang="en-US" sz="1200" dirty="0"/>
+              <a:t>/Lecture-3-Deep-Computer-Vision-e43a17b50f7e4b5f8393c070b22340a3</a:t>
+            </a:r>
+          </a:p>
+        </p:txBody>
+      </p:sp>
+      <p:pic>
+        <p:nvPicPr>
+          <p:cNvPr id="10" name="Content Placeholder 6" descr="A close-up of several images of breast cancer&#10;&#10;Description automatically generated">
+            <a:extLst>
+              <a:ext uri="{FF2B5EF4-FFF2-40B4-BE49-F238E27FC236}">
+                <a16:creationId xmlns:a16="http://schemas.microsoft.com/office/drawing/2014/main" id="{982500EF-05F9-103A-82C7-96BA4D2A250C}"/>
+              </a:ext>
+            </a:extLst>
+          </p:cNvPr>
+          <p:cNvPicPr>
+            <a:picLocks noChangeAspect="1"/>
+          </p:cNvPicPr>
+          <p:nvPr/>
+        </p:nvPicPr>
+        <p:blipFill>
+          <a:blip r:embed="rId2">
+            <a:extLst>
+              <a:ext uri="{28A0092B-C50C-407E-A947-70E740481C1C}">
+                <a14:useLocalDpi xmlns:a14="http://schemas.microsoft.com/office/drawing/2010/main" val="0"/>
+              </a:ext>
+            </a:extLst>
+          </a:blip>
+          <a:stretch>
+            <a:fillRect/>
+          </a:stretch>
+        </p:blipFill>
+        <p:spPr>
+          <a:xfrm>
+            <a:off x="2849230" y="1690688"/>
+            <a:ext cx="8616950" cy="4590797"/>
+          </a:xfrm>
+          <a:prstGeom prst="rect">
+            <a:avLst/>
+          </a:prstGeom>
+        </p:spPr>
+      </p:pic>
+    </p:spTree>
+    <p:extLst>
+      <p:ext uri="{BB962C8B-B14F-4D97-AF65-F5344CB8AC3E}">
+        <p14:creationId xmlns:p14="http://schemas.microsoft.com/office/powerpoint/2010/main" val="2323810826"/>
+      </p:ext>
+    </p:extLst>
+  </p:cSld>
+  <p:clrMapOvr>
+    <a:masterClrMapping/>
+  </p:clrMapOvr>
+</p:sld>
+</file>
+
+<file path=ppt/slides/slide4.xml><?xml version="1.0" encoding="utf-8"?>
+<p:sld xmlns:a="http://schemas.openxmlformats.org/drawingml/2006/main" xmlns:r="http://schemas.openxmlformats.org/officeDocument/2006/relationships" xmlns:p="http://schemas.openxmlformats.org/presentationml/2006/main">
+  <p:cSld>
+    <p:spTree>
+      <p:nvGrpSpPr>
+        <p:cNvPr id="1" name=""/>
+        <p:cNvGrpSpPr/>
+        <p:nvPr/>
+      </p:nvGrpSpPr>
+      <p:grpSpPr>
+        <a:xfrm>
+          <a:off x="0" y="0"/>
+          <a:ext cx="0" cy="0"/>
+          <a:chOff x="0" y="0"/>
+          <a:chExt cx="0" cy="0"/>
+        </a:xfrm>
+      </p:grpSpPr>
+      <p:sp>
+        <p:nvSpPr>
+          <p:cNvPr id="2" name="Title 1">
+            <a:extLst>
+              <a:ext uri="{FF2B5EF4-FFF2-40B4-BE49-F238E27FC236}">
+                <a16:creationId xmlns:a16="http://schemas.microsoft.com/office/drawing/2014/main" id="{C1408547-A1C8-34D3-1BDB-E17887F858CB}"/>
+              </a:ext>
+            </a:extLst>
+          </p:cNvPr>
+          <p:cNvSpPr>
+            <a:spLocks noGrp="1"/>
+          </p:cNvSpPr>
+          <p:nvPr>
+            <p:ph type="title"/>
+          </p:nvPr>
+        </p:nvSpPr>
+        <p:spPr/>
+        <p:txBody>
+          <a:bodyPr/>
+          <a:lstStyle/>
+          <a:p>
+            <a:r>
+              <a:rPr lang="en-US" dirty="0"/>
+              <a:t>How Computer Sees:</a:t>
+            </a:r>
+            <a:br>
+              <a:rPr lang="en-US" dirty="0"/>
+            </a:br>
+            <a:r>
+              <a:rPr lang="en-US" dirty="0"/>
+              <a:t>Images are numbers</a:t>
+            </a:r>
+          </a:p>
+        </p:txBody>
+      </p:sp>
+      <p:pic>
+        <p:nvPicPr>
+          <p:cNvPr id="5" name="Picture 4" descr="A screenshot of a computer game&#10;&#10;Description automatically generated">
+            <a:extLst>
+              <a:ext uri="{FF2B5EF4-FFF2-40B4-BE49-F238E27FC236}">
+                <a16:creationId xmlns:a16="http://schemas.microsoft.com/office/drawing/2014/main" id="{E6FA0E86-A95E-ACA9-7A99-D20382B82D22}"/>
+              </a:ext>
+            </a:extLst>
+          </p:cNvPr>
+          <p:cNvPicPr>
+            <a:picLocks noChangeAspect="1"/>
+          </p:cNvPicPr>
+          <p:nvPr/>
+        </p:nvPicPr>
+        <p:blipFill rotWithShape="1">
+          <a:blip r:embed="rId2">
+            <a:extLst>
+              <a:ext uri="{28A0092B-C50C-407E-A947-70E740481C1C}">
+                <a14:useLocalDpi xmlns:a14="http://schemas.microsoft.com/office/drawing/2010/main" val="0"/>
+              </a:ext>
+            </a:extLst>
+          </a:blip>
+          <a:srcRect t="13914"/>
+          <a:stretch/>
+        </p:blipFill>
+        <p:spPr>
+          <a:xfrm>
+            <a:off x="1778000" y="1690688"/>
+            <a:ext cx="9359860" cy="4303712"/>
+          </a:xfrm>
+          <a:prstGeom prst="rect">
+            <a:avLst/>
+          </a:prstGeom>
+        </p:spPr>
+      </p:pic>
+      <p:sp>
+        <p:nvSpPr>
+          <p:cNvPr id="6" name="Content Placeholder 8">
+            <a:extLst>
+              <a:ext uri="{FF2B5EF4-FFF2-40B4-BE49-F238E27FC236}">
+                <a16:creationId xmlns:a16="http://schemas.microsoft.com/office/drawing/2014/main" id="{73E6E25A-A379-D71D-1F11-80F040AA3FCE}"/>
+              </a:ext>
+            </a:extLst>
+          </p:cNvPr>
+          <p:cNvSpPr>
+            <a:spLocks noGrp="1"/>
+          </p:cNvSpPr>
+          <p:nvPr>
+            <p:ph idx="1"/>
+          </p:nvPr>
+        </p:nvSpPr>
+        <p:spPr>
+          <a:xfrm>
+            <a:off x="838200" y="6358823"/>
+            <a:ext cx="10515600" cy="499177"/>
+          </a:xfrm>
+        </p:spPr>
+        <p:txBody>
+          <a:bodyPr>
+            <a:normAutofit/>
+          </a:bodyPr>
+          <a:lstStyle/>
+          <a:p>
+            <a:pPr marL="0" indent="0">
+              <a:buNone/>
+            </a:pPr>
+            <a:r>
+              <a:rPr lang="en-US" sz="1200" dirty="0"/>
+              <a:t>Source: MIT 6.S191 Introduction to Deep Learning (2022)</a:t>
+            </a:r>
+          </a:p>
+        </p:txBody>
+      </p:sp>
+    </p:spTree>
+    <p:extLst>
+      <p:ext uri="{BB962C8B-B14F-4D97-AF65-F5344CB8AC3E}">
+        <p14:creationId xmlns:p14="http://schemas.microsoft.com/office/powerpoint/2010/main" val="3561200456"/>
+      </p:ext>
+    </p:extLst>
+  </p:cSld>
+  <p:clrMapOvr>
+    <a:masterClrMapping/>
+  </p:clrMapOvr>
+</p:sld>
+</file>
+
+<file path=ppt/slides/slide5.xml><?xml version="1.0" encoding="utf-8"?>
+<p:sld xmlns:a="http://schemas.openxmlformats.org/drawingml/2006/main" xmlns:r="http://schemas.openxmlformats.org/officeDocument/2006/relationships" xmlns:p="http://schemas.openxmlformats.org/presentationml/2006/main">
+  <p:cSld>
+    <p:spTree>
+      <p:nvGrpSpPr>
+        <p:cNvPr id="1" name=""/>
+        <p:cNvGrpSpPr/>
+        <p:nvPr/>
+      </p:nvGrpSpPr>
+      <p:grpSpPr>
+        <a:xfrm>
+          <a:off x="0" y="0"/>
+          <a:ext cx="0" cy="0"/>
+          <a:chOff x="0" y="0"/>
+          <a:chExt cx="0" cy="0"/>
+        </a:xfrm>
+      </p:grpSpPr>
+      <p:sp>
+        <p:nvSpPr>
+          <p:cNvPr id="2" name="Title 1">
+            <a:extLst>
+              <a:ext uri="{FF2B5EF4-FFF2-40B4-BE49-F238E27FC236}">
+                <a16:creationId xmlns:a16="http://schemas.microsoft.com/office/drawing/2014/main" id="{E2C9D31F-3EE4-0EEB-9BA5-F695939FF43D}"/>
+              </a:ext>
+            </a:extLst>
+          </p:cNvPr>
+          <p:cNvSpPr>
+            <a:spLocks noGrp="1"/>
+          </p:cNvSpPr>
+          <p:nvPr>
+            <p:ph type="title"/>
+          </p:nvPr>
+        </p:nvSpPr>
+        <p:spPr/>
+        <p:txBody>
+          <a:bodyPr/>
+          <a:lstStyle/>
+          <a:p>
+            <a:r>
+              <a:rPr lang="en-US" dirty="0"/>
+              <a:t>X-Ray</a:t>
+            </a:r>
+          </a:p>
+        </p:txBody>
+      </p:sp>
+      <p:pic>
+        <p:nvPicPr>
+          <p:cNvPr id="6" name="Content Placeholder 5" descr="X-ray of a child's chest&#10;&#10;Description automatically generated">
+            <a:extLst>
+              <a:ext uri="{FF2B5EF4-FFF2-40B4-BE49-F238E27FC236}">
+                <a16:creationId xmlns:a16="http://schemas.microsoft.com/office/drawing/2014/main" id="{11C95C64-282C-8BBC-8953-0E7CCE5934FE}"/>
+              </a:ext>
+            </a:extLst>
+          </p:cNvPr>
+          <p:cNvPicPr>
+            <a:picLocks noGrp="1" noChangeAspect="1"/>
+          </p:cNvPicPr>
+          <p:nvPr>
+            <p:ph idx="1"/>
+          </p:nvPr>
+        </p:nvPicPr>
+        <p:blipFill>
+          <a:blip r:embed="rId2">
+            <a:extLst>
+              <a:ext uri="{28A0092B-C50C-407E-A947-70E740481C1C}">
+                <a14:useLocalDpi xmlns:a14="http://schemas.microsoft.com/office/drawing/2010/main" val="0"/>
+              </a:ext>
+            </a:extLst>
+          </a:blip>
+          <a:stretch>
+            <a:fillRect/>
+          </a:stretch>
+        </p:blipFill>
+        <p:spPr>
+          <a:xfrm>
+            <a:off x="6874465" y="1690688"/>
+            <a:ext cx="4894669" cy="4351338"/>
+          </a:xfrm>
+        </p:spPr>
+      </p:pic>
+      <p:sp>
+        <p:nvSpPr>
+          <p:cNvPr id="4" name="Content Placeholder 8">
+            <a:extLst>
+              <a:ext uri="{FF2B5EF4-FFF2-40B4-BE49-F238E27FC236}">
+                <a16:creationId xmlns:a16="http://schemas.microsoft.com/office/drawing/2014/main" id="{E8E55FB2-1B05-28A3-C83C-5CC5DD845249}"/>
+              </a:ext>
+            </a:extLst>
+          </p:cNvPr>
+          <p:cNvSpPr txBox="1">
+            <a:spLocks/>
+          </p:cNvSpPr>
+          <p:nvPr/>
+        </p:nvSpPr>
+        <p:spPr>
+          <a:xfrm>
+            <a:off x="838200" y="6358823"/>
+            <a:ext cx="10515600" cy="499177"/>
+          </a:xfrm>
+          <a:prstGeom prst="rect">
+            <a:avLst/>
+          </a:prstGeom>
+        </p:spPr>
+        <p:txBody>
+          <a:bodyPr vert="horz" lIns="91440" tIns="45720" rIns="91440" bIns="45720" rtlCol="0">
+            <a:normAutofit/>
+          </a:bodyPr>
+          <a:lstStyle>
+            <a:lvl1pPr marL="228600" indent="-228600" algn="l" defTabSz="914400" rtl="0" eaLnBrk="1" latinLnBrk="0" hangingPunct="1">
+              <a:lnSpc>
+                <a:spcPct val="90000"/>
+              </a:lnSpc>
+              <a:spcBef>
+                <a:spcPts val="1000"/>
+              </a:spcBef>
+              <a:buFont typeface="Arial" panose="020B0604020202020204" pitchFamily="34" charset="0"/>
+              <a:buChar char="•"/>
+              <a:defRPr sz="2800" kern="1200">
+                <a:solidFill>
+                  <a:schemeClr val="tx1"/>
+                </a:solidFill>
+                <a:latin typeface="+mn-lt"/>
+                <a:ea typeface="+mn-ea"/>
+                <a:cs typeface="+mn-cs"/>
+              </a:defRPr>
+            </a:lvl1pPr>
+            <a:lvl2pPr marL="685800" indent="-228600" algn="l" defTabSz="914400" rtl="0" eaLnBrk="1" latinLnBrk="0" hangingPunct="1">
+              <a:lnSpc>
+                <a:spcPct val="90000"/>
+              </a:lnSpc>
+              <a:spcBef>
+                <a:spcPts val="500"/>
+              </a:spcBef>
+              <a:buFont typeface="Arial" panose="020B0604020202020204" pitchFamily="34" charset="0"/>
+              <a:buChar char="•"/>
+              <a:defRPr sz="2400" kern="1200">
+                <a:solidFill>
+                  <a:schemeClr val="tx1"/>
+                </a:solidFill>
+                <a:latin typeface="+mn-lt"/>
+                <a:ea typeface="+mn-ea"/>
+                <a:cs typeface="+mn-cs"/>
+              </a:defRPr>
+            </a:lvl2pPr>
+            <a:lvl3pPr marL="1143000" indent="-228600" algn="l" defTabSz="914400" rtl="0" eaLnBrk="1" latinLnBrk="0" hangingPunct="1">
+              <a:lnSpc>
+                <a:spcPct val="90000"/>
+              </a:lnSpc>
+              <a:spcBef>
+                <a:spcPts val="500"/>
+              </a:spcBef>
+              <a:buFont typeface="Arial" panose="020B0604020202020204" pitchFamily="34" charset="0"/>
+              <a:buChar char="•"/>
+              <a:defRPr sz="2000" kern="1200">
+                <a:solidFill>
+                  <a:schemeClr val="tx1"/>
+                </a:solidFill>
+                <a:latin typeface="+mn-lt"/>
+                <a:ea typeface="+mn-ea"/>
+                <a:cs typeface="+mn-cs"/>
+              </a:defRPr>
+            </a:lvl3pPr>
+            <a:lvl4pPr marL="1600200" indent="-228600" algn="l" defTabSz="914400" rtl="0" eaLnBrk="1" latinLnBrk="0" hangingPunct="1">
+              <a:lnSpc>
+                <a:spcPct val="90000"/>
+              </a:lnSpc>
+              <a:spcBef>
+                <a:spcPts val="500"/>
+              </a:spcBef>
+              <a:buFont typeface="Arial" panose="020B0604020202020204" pitchFamily="34" charset="0"/>
+              <a:buChar char="•"/>
+              <a:defRPr sz="1800" kern="1200">
+                <a:solidFill>
+                  <a:schemeClr val="tx1"/>
+                </a:solidFill>
+                <a:latin typeface="+mn-lt"/>
+                <a:ea typeface="+mn-ea"/>
+                <a:cs typeface="+mn-cs"/>
+              </a:defRPr>
+            </a:lvl4pPr>
+            <a:lvl5pPr marL="2057400" indent="-228600" algn="l" defTabSz="914400" rtl="0" eaLnBrk="1" latinLnBrk="0" hangingPunct="1">
+              <a:lnSpc>
+                <a:spcPct val="90000"/>
+              </a:lnSpc>
+              <a:spcBef>
+                <a:spcPts val="500"/>
+              </a:spcBef>
+              <a:buFont typeface="Arial" panose="020B0604020202020204" pitchFamily="34" charset="0"/>
+              <a:buChar char="•"/>
+              <a:defRPr sz="1800" kern="1200">
+                <a:solidFill>
+                  <a:schemeClr val="tx1"/>
+                </a:solidFill>
+                <a:latin typeface="+mn-lt"/>
+                <a:ea typeface="+mn-ea"/>
+                <a:cs typeface="+mn-cs"/>
+              </a:defRPr>
+            </a:lvl5pPr>
+            <a:lvl6pPr marL="2514600" indent="-228600" algn="l" defTabSz="914400" rtl="0" eaLnBrk="1" latinLnBrk="0" hangingPunct="1">
+              <a:lnSpc>
+                <a:spcPct val="90000"/>
+              </a:lnSpc>
+              <a:spcBef>
+                <a:spcPts val="500"/>
+              </a:spcBef>
+              <a:buFont typeface="Arial" panose="020B0604020202020204" pitchFamily="34" charset="0"/>
+              <a:buChar char="•"/>
+              <a:defRPr sz="1800" kern="1200">
+                <a:solidFill>
+                  <a:schemeClr val="tx1"/>
+                </a:solidFill>
+                <a:latin typeface="+mn-lt"/>
+                <a:ea typeface="+mn-ea"/>
+                <a:cs typeface="+mn-cs"/>
+              </a:defRPr>
+            </a:lvl6pPr>
+            <a:lvl7pPr marL="2971800" indent="-228600" algn="l" defTabSz="914400" rtl="0" eaLnBrk="1" latinLnBrk="0" hangingPunct="1">
+              <a:lnSpc>
+                <a:spcPct val="90000"/>
+              </a:lnSpc>
+              <a:spcBef>
+                <a:spcPts val="500"/>
+              </a:spcBef>
+              <a:buFont typeface="Arial" panose="020B0604020202020204" pitchFamily="34" charset="0"/>
+              <a:buChar char="•"/>
+              <a:defRPr sz="1800" kern="1200">
+                <a:solidFill>
+                  <a:schemeClr val="tx1"/>
+                </a:solidFill>
+                <a:latin typeface="+mn-lt"/>
+                <a:ea typeface="+mn-ea"/>
+                <a:cs typeface="+mn-cs"/>
+              </a:defRPr>
+            </a:lvl7pPr>
+            <a:lvl8pPr marL="3429000" indent="-228600" algn="l" defTabSz="914400" rtl="0" eaLnBrk="1" latinLnBrk="0" hangingPunct="1">
+              <a:lnSpc>
+                <a:spcPct val="90000"/>
+              </a:lnSpc>
+              <a:spcBef>
+                <a:spcPts val="500"/>
+              </a:spcBef>
+              <a:buFont typeface="Arial" panose="020B0604020202020204" pitchFamily="34" charset="0"/>
+              <a:buChar char="•"/>
+              <a:defRPr sz="1800" kern="1200">
+                <a:solidFill>
+                  <a:schemeClr val="tx1"/>
+                </a:solidFill>
+                <a:latin typeface="+mn-lt"/>
+                <a:ea typeface="+mn-ea"/>
+                <a:cs typeface="+mn-cs"/>
+              </a:defRPr>
+            </a:lvl8pPr>
+            <a:lvl9pPr marL="3886200" indent="-228600" algn="l" defTabSz="914400" rtl="0" eaLnBrk="1" latinLnBrk="0" hangingPunct="1">
+              <a:lnSpc>
+                <a:spcPct val="90000"/>
+              </a:lnSpc>
+              <a:spcBef>
+                <a:spcPts val="500"/>
+              </a:spcBef>
+              <a:buFont typeface="Arial" panose="020B0604020202020204" pitchFamily="34" charset="0"/>
+              <a:buChar char="•"/>
+              <a:defRPr sz="1800" kern="1200">
+                <a:solidFill>
+                  <a:schemeClr val="tx1"/>
+                </a:solidFill>
+                <a:latin typeface="+mn-lt"/>
+                <a:ea typeface="+mn-ea"/>
+                <a:cs typeface="+mn-cs"/>
+              </a:defRPr>
+            </a:lvl9pPr>
+          </a:lstStyle>
+          <a:p>
+            <a:pPr marL="0" indent="0">
+              <a:buNone/>
+            </a:pPr>
+            <a:r>
+              <a:rPr lang="en-US" sz="1200" dirty="0"/>
+              <a:t>Source: https://</a:t>
+            </a:r>
+            <a:r>
+              <a:rPr lang="en-US" sz="1200" dirty="0" err="1"/>
+              <a:t>data.mendeley.com</a:t>
+            </a:r>
+            <a:r>
+              <a:rPr lang="en-US" sz="1200" dirty="0"/>
+              <a:t>/datasets/rscbjbr9sj/2</a:t>
+            </a:r>
+          </a:p>
+          <a:p>
+            <a:pPr marL="0" indent="0">
+              <a:buFont typeface="Arial" panose="020B0604020202020204" pitchFamily="34" charset="0"/>
+              <a:buNone/>
+            </a:pPr>
+            <a:endParaRPr lang="en-US" sz="1200" dirty="0"/>
+          </a:p>
+        </p:txBody>
+      </p:sp>
+      <p:pic>
+        <p:nvPicPr>
+          <p:cNvPr id="8" name="Picture 7" descr="A x-ray of a person's chest&#10;&#10;Description automatically generated">
+            <a:extLst>
+              <a:ext uri="{FF2B5EF4-FFF2-40B4-BE49-F238E27FC236}">
+                <a16:creationId xmlns:a16="http://schemas.microsoft.com/office/drawing/2014/main" id="{F55B7B46-A3F0-10BD-59EC-79F09C930C6E}"/>
+              </a:ext>
+            </a:extLst>
+          </p:cNvPr>
+          <p:cNvPicPr>
+            <a:picLocks noChangeAspect="1"/>
+          </p:cNvPicPr>
+          <p:nvPr/>
+        </p:nvPicPr>
+        <p:blipFill>
+          <a:blip r:embed="rId3">
+            <a:extLst>
+              <a:ext uri="{28A0092B-C50C-407E-A947-70E740481C1C}">
+                <a14:useLocalDpi xmlns:a14="http://schemas.microsoft.com/office/drawing/2010/main" val="0"/>
+              </a:ext>
+            </a:extLst>
+          </a:blip>
+          <a:stretch>
+            <a:fillRect/>
+          </a:stretch>
+        </p:blipFill>
+        <p:spPr>
+          <a:xfrm>
+            <a:off x="1016000" y="2095942"/>
+            <a:ext cx="5511428" cy="3390457"/>
+          </a:xfrm>
+          <a:prstGeom prst="rect">
+            <a:avLst/>
+          </a:prstGeom>
+        </p:spPr>
+      </p:pic>
+    </p:spTree>
+    <p:extLst>
+      <p:ext uri="{BB962C8B-B14F-4D97-AF65-F5344CB8AC3E}">
+        <p14:creationId xmlns:p14="http://schemas.microsoft.com/office/powerpoint/2010/main" val="1486256131"/>
+      </p:ext>
+    </p:extLst>
+  </p:cSld>
+  <p:clrMapOvr>
+    <a:masterClrMapping/>
+  </p:clrMapOvr>
+</p:sld>
+</file>
+
+<file path=ppt/slides/slide6.xml><?xml version="1.0" encoding="utf-8"?>
+<p:sld xmlns:a="http://schemas.openxmlformats.org/drawingml/2006/main" xmlns:r="http://schemas.openxmlformats.org/officeDocument/2006/relationships" xmlns:p="http://schemas.openxmlformats.org/presentationml/2006/main">
+  <p:cSld>
+    <p:spTree>
+      <p:nvGrpSpPr>
+        <p:cNvPr id="1" name=""/>
+        <p:cNvGrpSpPr/>
+        <p:nvPr/>
+      </p:nvGrpSpPr>
+      <p:grpSpPr>
+        <a:xfrm>
+          <a:off x="0" y="0"/>
+          <a:ext cx="0" cy="0"/>
+          <a:chOff x="0" y="0"/>
+          <a:chExt cx="0" cy="0"/>
+        </a:xfrm>
+      </p:grpSpPr>
+      <p:sp>
+        <p:nvSpPr>
+          <p:cNvPr id="2" name="Title 1">
+            <a:extLst>
+              <a:ext uri="{FF2B5EF4-FFF2-40B4-BE49-F238E27FC236}">
+                <a16:creationId xmlns:a16="http://schemas.microsoft.com/office/drawing/2014/main" id="{43FE8AB0-F424-97DB-500E-B810DB0E6802}"/>
+              </a:ext>
+            </a:extLst>
+          </p:cNvPr>
+          <p:cNvSpPr>
+            <a:spLocks noGrp="1"/>
+          </p:cNvSpPr>
+          <p:nvPr>
+            <p:ph type="title"/>
+          </p:nvPr>
+        </p:nvSpPr>
+        <p:spPr/>
+        <p:txBody>
+          <a:bodyPr/>
+          <a:lstStyle/>
+          <a:p>
+            <a:r>
+              <a:rPr lang="en-US" dirty="0"/>
+              <a:t>CT Scan</a:t>
+            </a:r>
+          </a:p>
+        </p:txBody>
+      </p:sp>
+      <p:pic>
+        <p:nvPicPr>
+          <p:cNvPr id="6" name="Content Placeholder 5" descr="A close-up of a ct scan&#10;&#10;Description automatically generated">
+            <a:extLst>
+              <a:ext uri="{FF2B5EF4-FFF2-40B4-BE49-F238E27FC236}">
+                <a16:creationId xmlns:a16="http://schemas.microsoft.com/office/drawing/2014/main" id="{0C08B175-930E-8EBF-9B2D-556AA6696152}"/>
+              </a:ext>
+            </a:extLst>
+          </p:cNvPr>
+          <p:cNvPicPr>
+            <a:picLocks noGrp="1" noChangeAspect="1"/>
+          </p:cNvPicPr>
+          <p:nvPr>
+            <p:ph idx="1"/>
+          </p:nvPr>
+        </p:nvPicPr>
+        <p:blipFill>
+          <a:blip r:embed="rId2">
+            <a:extLst>
+              <a:ext uri="{28A0092B-C50C-407E-A947-70E740481C1C}">
+                <a14:useLocalDpi xmlns:a14="http://schemas.microsoft.com/office/drawing/2010/main" val="0"/>
+              </a:ext>
+            </a:extLst>
+          </a:blip>
+          <a:stretch>
+            <a:fillRect/>
+          </a:stretch>
+        </p:blipFill>
+        <p:spPr>
+          <a:xfrm>
+            <a:off x="4991100" y="1690687"/>
+            <a:ext cx="6616700" cy="4474603"/>
+          </a:xfrm>
+        </p:spPr>
+      </p:pic>
+      <p:sp>
+        <p:nvSpPr>
+          <p:cNvPr id="4" name="Content Placeholder 8">
+            <a:extLst>
+              <a:ext uri="{FF2B5EF4-FFF2-40B4-BE49-F238E27FC236}">
+                <a16:creationId xmlns:a16="http://schemas.microsoft.com/office/drawing/2014/main" id="{12BB1540-A4DE-64AC-E342-2E29B27E020B}"/>
+              </a:ext>
+            </a:extLst>
+          </p:cNvPr>
+          <p:cNvSpPr txBox="1">
+            <a:spLocks/>
+          </p:cNvSpPr>
+          <p:nvPr/>
+        </p:nvSpPr>
+        <p:spPr>
+          <a:xfrm>
+            <a:off x="838200" y="6358823"/>
+            <a:ext cx="10515600" cy="499177"/>
+          </a:xfrm>
+          <a:prstGeom prst="rect">
+            <a:avLst/>
+          </a:prstGeom>
+        </p:spPr>
+        <p:txBody>
+          <a:bodyPr vert="horz" lIns="91440" tIns="45720" rIns="91440" bIns="45720" rtlCol="0">
+            <a:normAutofit/>
+          </a:bodyPr>
+          <a:lstStyle>
+            <a:lvl1pPr marL="228600" indent="-228600" algn="l" defTabSz="914400" rtl="0" eaLnBrk="1" latinLnBrk="0" hangingPunct="1">
+              <a:lnSpc>
+                <a:spcPct val="90000"/>
+              </a:lnSpc>
+              <a:spcBef>
+                <a:spcPts val="1000"/>
+              </a:spcBef>
+              <a:buFont typeface="Arial" panose="020B0604020202020204" pitchFamily="34" charset="0"/>
+              <a:buChar char="•"/>
+              <a:defRPr sz="2800" kern="1200">
+                <a:solidFill>
+                  <a:schemeClr val="tx1"/>
+                </a:solidFill>
+                <a:latin typeface="+mn-lt"/>
+                <a:ea typeface="+mn-ea"/>
+                <a:cs typeface="+mn-cs"/>
+              </a:defRPr>
+            </a:lvl1pPr>
+            <a:lvl2pPr marL="685800" indent="-228600" algn="l" defTabSz="914400" rtl="0" eaLnBrk="1" latinLnBrk="0" hangingPunct="1">
+              <a:lnSpc>
+                <a:spcPct val="90000"/>
+              </a:lnSpc>
+              <a:spcBef>
+                <a:spcPts val="500"/>
+              </a:spcBef>
+              <a:buFont typeface="Arial" panose="020B0604020202020204" pitchFamily="34" charset="0"/>
+              <a:buChar char="•"/>
+              <a:defRPr sz="2400" kern="1200">
+                <a:solidFill>
+                  <a:schemeClr val="tx1"/>
+                </a:solidFill>
+                <a:latin typeface="+mn-lt"/>
+                <a:ea typeface="+mn-ea"/>
+                <a:cs typeface="+mn-cs"/>
+              </a:defRPr>
+            </a:lvl2pPr>
+            <a:lvl3pPr marL="1143000" indent="-228600" algn="l" defTabSz="914400" rtl="0" eaLnBrk="1" latinLnBrk="0" hangingPunct="1">
+              <a:lnSpc>
+                <a:spcPct val="90000"/>
+              </a:lnSpc>
+              <a:spcBef>
+                <a:spcPts val="500"/>
+              </a:spcBef>
+              <a:buFont typeface="Arial" panose="020B0604020202020204" pitchFamily="34" charset="0"/>
+              <a:buChar char="•"/>
+              <a:defRPr sz="2000" kern="1200">
+                <a:solidFill>
+                  <a:schemeClr val="tx1"/>
+                </a:solidFill>
+                <a:latin typeface="+mn-lt"/>
+                <a:ea typeface="+mn-ea"/>
+                <a:cs typeface="+mn-cs"/>
+              </a:defRPr>
+            </a:lvl3pPr>
+            <a:lvl4pPr marL="1600200" indent="-228600" algn="l" defTabSz="914400" rtl="0" eaLnBrk="1" latinLnBrk="0" hangingPunct="1">
+              <a:lnSpc>
+                <a:spcPct val="90000"/>
+              </a:lnSpc>
+              <a:spcBef>
+                <a:spcPts val="500"/>
+              </a:spcBef>
+              <a:buFont typeface="Arial" panose="020B0604020202020204" pitchFamily="34" charset="0"/>
+              <a:buChar char="•"/>
+              <a:defRPr sz="1800" kern="1200">
+                <a:solidFill>
+                  <a:schemeClr val="tx1"/>
+                </a:solidFill>
+                <a:latin typeface="+mn-lt"/>
+                <a:ea typeface="+mn-ea"/>
+                <a:cs typeface="+mn-cs"/>
+              </a:defRPr>
+            </a:lvl4pPr>
+            <a:lvl5pPr marL="2057400" indent="-228600" algn="l" defTabSz="914400" rtl="0" eaLnBrk="1" latinLnBrk="0" hangingPunct="1">
+              <a:lnSpc>
+                <a:spcPct val="90000"/>
+              </a:lnSpc>
+              <a:spcBef>
+                <a:spcPts val="500"/>
+              </a:spcBef>
+              <a:buFont typeface="Arial" panose="020B0604020202020204" pitchFamily="34" charset="0"/>
+              <a:buChar char="•"/>
+              <a:defRPr sz="1800" kern="1200">
+                <a:solidFill>
+                  <a:schemeClr val="tx1"/>
+                </a:solidFill>
+                <a:latin typeface="+mn-lt"/>
+                <a:ea typeface="+mn-ea"/>
+                <a:cs typeface="+mn-cs"/>
+              </a:defRPr>
+            </a:lvl5pPr>
+            <a:lvl6pPr marL="2514600" indent="-228600" algn="l" defTabSz="914400" rtl="0" eaLnBrk="1" latinLnBrk="0" hangingPunct="1">
+              <a:lnSpc>
+                <a:spcPct val="90000"/>
+              </a:lnSpc>
+              <a:spcBef>
+                <a:spcPts val="500"/>
+              </a:spcBef>
+              <a:buFont typeface="Arial" panose="020B0604020202020204" pitchFamily="34" charset="0"/>
+              <a:buChar char="•"/>
+              <a:defRPr sz="1800" kern="1200">
+                <a:solidFill>
+                  <a:schemeClr val="tx1"/>
+                </a:solidFill>
+                <a:latin typeface="+mn-lt"/>
+                <a:ea typeface="+mn-ea"/>
+                <a:cs typeface="+mn-cs"/>
+              </a:defRPr>
+            </a:lvl6pPr>
+            <a:lvl7pPr marL="2971800" indent="-228600" algn="l" defTabSz="914400" rtl="0" eaLnBrk="1" latinLnBrk="0" hangingPunct="1">
+              <a:lnSpc>
+                <a:spcPct val="90000"/>
+              </a:lnSpc>
+              <a:spcBef>
+                <a:spcPts val="500"/>
+              </a:spcBef>
+              <a:buFont typeface="Arial" panose="020B0604020202020204" pitchFamily="34" charset="0"/>
+              <a:buChar char="•"/>
+              <a:defRPr sz="1800" kern="1200">
+                <a:solidFill>
+                  <a:schemeClr val="tx1"/>
+                </a:solidFill>
+                <a:latin typeface="+mn-lt"/>
+                <a:ea typeface="+mn-ea"/>
+                <a:cs typeface="+mn-cs"/>
+              </a:defRPr>
+            </a:lvl7pPr>
+            <a:lvl8pPr marL="3429000" indent="-228600" algn="l" defTabSz="914400" rtl="0" eaLnBrk="1" latinLnBrk="0" hangingPunct="1">
+              <a:lnSpc>
+                <a:spcPct val="90000"/>
+              </a:lnSpc>
+              <a:spcBef>
+                <a:spcPts val="500"/>
+              </a:spcBef>
+              <a:buFont typeface="Arial" panose="020B0604020202020204" pitchFamily="34" charset="0"/>
+              <a:buChar char="•"/>
+              <a:defRPr sz="1800" kern="1200">
+                <a:solidFill>
+                  <a:schemeClr val="tx1"/>
+                </a:solidFill>
+                <a:latin typeface="+mn-lt"/>
+                <a:ea typeface="+mn-ea"/>
+                <a:cs typeface="+mn-cs"/>
+              </a:defRPr>
+            </a:lvl8pPr>
+            <a:lvl9pPr marL="3886200" indent="-228600" algn="l" defTabSz="914400" rtl="0" eaLnBrk="1" latinLnBrk="0" hangingPunct="1">
+              <a:lnSpc>
+                <a:spcPct val="90000"/>
+              </a:lnSpc>
+              <a:spcBef>
+                <a:spcPts val="500"/>
+              </a:spcBef>
+              <a:buFont typeface="Arial" panose="020B0604020202020204" pitchFamily="34" charset="0"/>
+              <a:buChar char="•"/>
+              <a:defRPr sz="1800" kern="1200">
+                <a:solidFill>
+                  <a:schemeClr val="tx1"/>
+                </a:solidFill>
+                <a:latin typeface="+mn-lt"/>
+                <a:ea typeface="+mn-ea"/>
+                <a:cs typeface="+mn-cs"/>
+              </a:defRPr>
+            </a:lvl9pPr>
+          </a:lstStyle>
+          <a:p>
+            <a:pPr marL="0" indent="0">
+              <a:buNone/>
+            </a:pPr>
+            <a:r>
+              <a:rPr lang="en-US" sz="1200" dirty="0"/>
+              <a:t>Source: https://</a:t>
+            </a:r>
+            <a:r>
+              <a:rPr lang="en-US" sz="1200" dirty="0" err="1"/>
+              <a:t>www.kaggle.com</a:t>
+            </a:r>
+            <a:r>
+              <a:rPr lang="en-US" sz="1200" dirty="0"/>
+              <a:t>/datasets/</a:t>
+            </a:r>
+            <a:r>
+              <a:rPr lang="en-US" sz="1200" dirty="0" err="1"/>
+              <a:t>mohamedhanyyy</a:t>
+            </a:r>
+            <a:r>
+              <a:rPr lang="en-US" sz="1200" dirty="0"/>
+              <a:t>/chest-</a:t>
+            </a:r>
+            <a:r>
+              <a:rPr lang="en-US" sz="1200" dirty="0" err="1"/>
+              <a:t>ctscan</a:t>
+            </a:r>
+            <a:r>
+              <a:rPr lang="en-US" sz="1200" dirty="0"/>
+              <a:t>-images</a:t>
+            </a:r>
+          </a:p>
+        </p:txBody>
+      </p:sp>
+    </p:spTree>
+    <p:extLst>
+      <p:ext uri="{BB962C8B-B14F-4D97-AF65-F5344CB8AC3E}">
+        <p14:creationId xmlns:p14="http://schemas.microsoft.com/office/powerpoint/2010/main" val="4120219526"/>
+      </p:ext>
+    </p:extLst>
+  </p:cSld>
+  <p:clrMapOvr>
+    <a:masterClrMapping/>
+  </p:clrMapOvr>
+</p:sld>
+</file>
+
+<file path=ppt/slides/slide7.xml><?xml version="1.0" encoding="utf-8"?>
+<p:sld xmlns:a="http://schemas.openxmlformats.org/drawingml/2006/main" xmlns:r="http://schemas.openxmlformats.org/officeDocument/2006/relationships" xmlns:p="http://schemas.openxmlformats.org/presentationml/2006/main">
+  <p:cSld>
+    <p:spTree>
+      <p:nvGrpSpPr>
+        <p:cNvPr id="1" name=""/>
+        <p:cNvGrpSpPr/>
+        <p:nvPr/>
+      </p:nvGrpSpPr>
+      <p:grpSpPr>
+        <a:xfrm>
+          <a:off x="0" y="0"/>
+          <a:ext cx="0" cy="0"/>
+          <a:chOff x="0" y="0"/>
+          <a:chExt cx="0" cy="0"/>
+        </a:xfrm>
+      </p:grpSpPr>
+      <p:sp>
+        <p:nvSpPr>
+          <p:cNvPr id="2" name="Title 1">
+            <a:extLst>
+              <a:ext uri="{FF2B5EF4-FFF2-40B4-BE49-F238E27FC236}">
+                <a16:creationId xmlns:a16="http://schemas.microsoft.com/office/drawing/2014/main" id="{43FE8AB0-F424-97DB-500E-B810DB0E6802}"/>
+              </a:ext>
+            </a:extLst>
+          </p:cNvPr>
+          <p:cNvSpPr>
+            <a:spLocks noGrp="1"/>
+          </p:cNvSpPr>
+          <p:nvPr>
+            <p:ph type="title"/>
+          </p:nvPr>
+        </p:nvSpPr>
+        <p:spPr/>
+        <p:txBody>
+          <a:bodyPr/>
+          <a:lstStyle/>
+          <a:p>
+            <a:r>
+              <a:rPr lang="en-US" dirty="0"/>
+              <a:t>MRI</a:t>
+            </a:r>
+          </a:p>
+        </p:txBody>
+      </p:sp>
+      <p:sp>
+        <p:nvSpPr>
+          <p:cNvPr id="4" name="Content Placeholder 8">
+            <a:extLst>
+              <a:ext uri="{FF2B5EF4-FFF2-40B4-BE49-F238E27FC236}">
+                <a16:creationId xmlns:a16="http://schemas.microsoft.com/office/drawing/2014/main" id="{12BB1540-A4DE-64AC-E342-2E29B27E020B}"/>
+              </a:ext>
+            </a:extLst>
+          </p:cNvPr>
+          <p:cNvSpPr txBox="1">
+            <a:spLocks/>
+          </p:cNvSpPr>
+          <p:nvPr/>
+        </p:nvSpPr>
+        <p:spPr>
+          <a:xfrm>
+            <a:off x="838200" y="6358823"/>
+            <a:ext cx="10515600" cy="499177"/>
+          </a:xfrm>
+          <a:prstGeom prst="rect">
+            <a:avLst/>
+          </a:prstGeom>
+        </p:spPr>
+        <p:txBody>
+          <a:bodyPr vert="horz" lIns="91440" tIns="45720" rIns="91440" bIns="45720" rtlCol="0">
+            <a:normAutofit/>
+          </a:bodyPr>
+          <a:lstStyle>
+            <a:lvl1pPr marL="228600" indent="-228600" algn="l" defTabSz="914400" rtl="0" eaLnBrk="1" latinLnBrk="0" hangingPunct="1">
+              <a:lnSpc>
+                <a:spcPct val="90000"/>
+              </a:lnSpc>
+              <a:spcBef>
+                <a:spcPts val="1000"/>
+              </a:spcBef>
+              <a:buFont typeface="Arial" panose="020B0604020202020204" pitchFamily="34" charset="0"/>
+              <a:buChar char="•"/>
+              <a:defRPr sz="2800" kern="1200">
+                <a:solidFill>
+                  <a:schemeClr val="tx1"/>
+                </a:solidFill>
+                <a:latin typeface="+mn-lt"/>
+                <a:ea typeface="+mn-ea"/>
+                <a:cs typeface="+mn-cs"/>
+              </a:defRPr>
+            </a:lvl1pPr>
+            <a:lvl2pPr marL="685800" indent="-228600" algn="l" defTabSz="914400" rtl="0" eaLnBrk="1" latinLnBrk="0" hangingPunct="1">
+              <a:lnSpc>
+                <a:spcPct val="90000"/>
+              </a:lnSpc>
+              <a:spcBef>
+                <a:spcPts val="500"/>
+              </a:spcBef>
+              <a:buFont typeface="Arial" panose="020B0604020202020204" pitchFamily="34" charset="0"/>
+              <a:buChar char="•"/>
+              <a:defRPr sz="2400" kern="1200">
+                <a:solidFill>
+                  <a:schemeClr val="tx1"/>
+                </a:solidFill>
+                <a:latin typeface="+mn-lt"/>
+                <a:ea typeface="+mn-ea"/>
+                <a:cs typeface="+mn-cs"/>
+              </a:defRPr>
+            </a:lvl2pPr>
+            <a:lvl3pPr marL="1143000" indent="-228600" algn="l" defTabSz="914400" rtl="0" eaLnBrk="1" latinLnBrk="0" hangingPunct="1">
+              <a:lnSpc>
+                <a:spcPct val="90000"/>
+              </a:lnSpc>
+              <a:spcBef>
+                <a:spcPts val="500"/>
+              </a:spcBef>
+              <a:buFont typeface="Arial" panose="020B0604020202020204" pitchFamily="34" charset="0"/>
+              <a:buChar char="•"/>
+              <a:defRPr sz="2000" kern="1200">
+                <a:solidFill>
+                  <a:schemeClr val="tx1"/>
+                </a:solidFill>
+                <a:latin typeface="+mn-lt"/>
+                <a:ea typeface="+mn-ea"/>
+                <a:cs typeface="+mn-cs"/>
+              </a:defRPr>
+            </a:lvl3pPr>
+            <a:lvl4pPr marL="1600200" indent="-228600" algn="l" defTabSz="914400" rtl="0" eaLnBrk="1" latinLnBrk="0" hangingPunct="1">
+              <a:lnSpc>
+                <a:spcPct val="90000"/>
+              </a:lnSpc>
+              <a:spcBef>
+                <a:spcPts val="500"/>
+              </a:spcBef>
+              <a:buFont typeface="Arial" panose="020B0604020202020204" pitchFamily="34" charset="0"/>
+              <a:buChar char="•"/>
+              <a:defRPr sz="1800" kern="1200">
+                <a:solidFill>
+                  <a:schemeClr val="tx1"/>
+                </a:solidFill>
+                <a:latin typeface="+mn-lt"/>
+                <a:ea typeface="+mn-ea"/>
+                <a:cs typeface="+mn-cs"/>
+              </a:defRPr>
+            </a:lvl4pPr>
+            <a:lvl5pPr marL="2057400" indent="-228600" algn="l" defTabSz="914400" rtl="0" eaLnBrk="1" latinLnBrk="0" hangingPunct="1">
+              <a:lnSpc>
+                <a:spcPct val="90000"/>
+              </a:lnSpc>
+              <a:spcBef>
+                <a:spcPts val="500"/>
+              </a:spcBef>
+              <a:buFont typeface="Arial" panose="020B0604020202020204" pitchFamily="34" charset="0"/>
+              <a:buChar char="•"/>
+              <a:defRPr sz="1800" kern="1200">
+                <a:solidFill>
+                  <a:schemeClr val="tx1"/>
+                </a:solidFill>
+                <a:latin typeface="+mn-lt"/>
+                <a:ea typeface="+mn-ea"/>
+                <a:cs typeface="+mn-cs"/>
+              </a:defRPr>
+            </a:lvl5pPr>
+            <a:lvl6pPr marL="2514600" indent="-228600" algn="l" defTabSz="914400" rtl="0" eaLnBrk="1" latinLnBrk="0" hangingPunct="1">
+              <a:lnSpc>
+                <a:spcPct val="90000"/>
+              </a:lnSpc>
+              <a:spcBef>
+                <a:spcPts val="500"/>
+              </a:spcBef>
+              <a:buFont typeface="Arial" panose="020B0604020202020204" pitchFamily="34" charset="0"/>
+              <a:buChar char="•"/>
+              <a:defRPr sz="1800" kern="1200">
+                <a:solidFill>
+                  <a:schemeClr val="tx1"/>
+                </a:solidFill>
+                <a:latin typeface="+mn-lt"/>
+                <a:ea typeface="+mn-ea"/>
+                <a:cs typeface="+mn-cs"/>
+              </a:defRPr>
+            </a:lvl6pPr>
+            <a:lvl7pPr marL="2971800" indent="-228600" algn="l" defTabSz="914400" rtl="0" eaLnBrk="1" latinLnBrk="0" hangingPunct="1">
+              <a:lnSpc>
+                <a:spcPct val="90000"/>
+              </a:lnSpc>
+              <a:spcBef>
+                <a:spcPts val="500"/>
+              </a:spcBef>
+              <a:buFont typeface="Arial" panose="020B0604020202020204" pitchFamily="34" charset="0"/>
+              <a:buChar char="•"/>
+              <a:defRPr sz="1800" kern="1200">
+                <a:solidFill>
+                  <a:schemeClr val="tx1"/>
+                </a:solidFill>
+                <a:latin typeface="+mn-lt"/>
+                <a:ea typeface="+mn-ea"/>
+                <a:cs typeface="+mn-cs"/>
+              </a:defRPr>
+            </a:lvl7pPr>
+            <a:lvl8pPr marL="3429000" indent="-228600" algn="l" defTabSz="914400" rtl="0" eaLnBrk="1" latinLnBrk="0" hangingPunct="1">
+              <a:lnSpc>
+                <a:spcPct val="90000"/>
+              </a:lnSpc>
+              <a:spcBef>
+                <a:spcPts val="500"/>
+              </a:spcBef>
+              <a:buFont typeface="Arial" panose="020B0604020202020204" pitchFamily="34" charset="0"/>
+              <a:buChar char="•"/>
+              <a:defRPr sz="1800" kern="1200">
+                <a:solidFill>
+                  <a:schemeClr val="tx1"/>
+                </a:solidFill>
+                <a:latin typeface="+mn-lt"/>
+                <a:ea typeface="+mn-ea"/>
+                <a:cs typeface="+mn-cs"/>
+              </a:defRPr>
+            </a:lvl8pPr>
+            <a:lvl9pPr marL="3886200" indent="-228600" algn="l" defTabSz="914400" rtl="0" eaLnBrk="1" latinLnBrk="0" hangingPunct="1">
+              <a:lnSpc>
+                <a:spcPct val="90000"/>
+              </a:lnSpc>
+              <a:spcBef>
+                <a:spcPts val="500"/>
+              </a:spcBef>
+              <a:buFont typeface="Arial" panose="020B0604020202020204" pitchFamily="34" charset="0"/>
+              <a:buChar char="•"/>
+              <a:defRPr sz="1800" kern="1200">
+                <a:solidFill>
+                  <a:schemeClr val="tx1"/>
+                </a:solidFill>
+                <a:latin typeface="+mn-lt"/>
+                <a:ea typeface="+mn-ea"/>
+                <a:cs typeface="+mn-cs"/>
+              </a:defRPr>
+            </a:lvl9pPr>
+          </a:lstStyle>
+          <a:p>
+            <a:pPr marL="0" indent="0">
+              <a:buNone/>
+            </a:pPr>
+            <a:r>
+              <a:rPr lang="en-US" sz="1200" dirty="0"/>
+              <a:t>Source: https://</a:t>
+            </a:r>
+            <a:r>
+              <a:rPr lang="en-US" sz="1200" dirty="0" err="1"/>
+              <a:t>www.kaggle.com</a:t>
+            </a:r>
+            <a:r>
+              <a:rPr lang="en-US" sz="1200" dirty="0"/>
+              <a:t>/datasets/</a:t>
+            </a:r>
+            <a:r>
+              <a:rPr lang="en-US" sz="1200" dirty="0" err="1"/>
+              <a:t>navoneel</a:t>
+            </a:r>
+            <a:r>
+              <a:rPr lang="en-US" sz="1200" dirty="0"/>
+              <a:t>/brain-</a:t>
+            </a:r>
+            <a:r>
+              <a:rPr lang="en-US" sz="1200" dirty="0" err="1"/>
+              <a:t>mri</a:t>
+            </a:r>
+            <a:r>
+              <a:rPr lang="en-US" sz="1200" dirty="0"/>
+              <a:t>-images-for-brain-tumor-detection</a:t>
+            </a:r>
+          </a:p>
+        </p:txBody>
+      </p:sp>
+      <p:pic>
+        <p:nvPicPr>
+          <p:cNvPr id="8" name="Content Placeholder 7" descr="A close-up of a brain scan&#10;&#10;Description automatically generated">
+            <a:extLst>
+              <a:ext uri="{FF2B5EF4-FFF2-40B4-BE49-F238E27FC236}">
+                <a16:creationId xmlns:a16="http://schemas.microsoft.com/office/drawing/2014/main" id="{1E9D83F6-C5A0-BDC9-CE11-521EEB168B5B}"/>
+              </a:ext>
+            </a:extLst>
+          </p:cNvPr>
+          <p:cNvPicPr>
+            <a:picLocks noGrp="1" noChangeAspect="1"/>
+          </p:cNvPicPr>
+          <p:nvPr>
+            <p:ph idx="1"/>
+          </p:nvPr>
+        </p:nvPicPr>
+        <p:blipFill>
+          <a:blip r:embed="rId2">
+            <a:extLst>
+              <a:ext uri="{28A0092B-C50C-407E-A947-70E740481C1C}">
+                <a14:useLocalDpi xmlns:a14="http://schemas.microsoft.com/office/drawing/2010/main" val="0"/>
+              </a:ext>
+            </a:extLst>
+          </a:blip>
+          <a:stretch>
+            <a:fillRect/>
+          </a:stretch>
+        </p:blipFill>
+        <p:spPr>
+          <a:xfrm>
+            <a:off x="7002462" y="1694656"/>
+            <a:ext cx="4351338" cy="4351338"/>
+          </a:xfrm>
+        </p:spPr>
+      </p:pic>
+      <p:pic>
+        <p:nvPicPr>
+          <p:cNvPr id="10" name="Picture 9" descr="A close-up of a brain scan&#10;&#10;Description automatically generated">
+            <a:extLst>
+              <a:ext uri="{FF2B5EF4-FFF2-40B4-BE49-F238E27FC236}">
+                <a16:creationId xmlns:a16="http://schemas.microsoft.com/office/drawing/2014/main" id="{EFADA823-7EC5-EBAB-E222-6705F4F3877F}"/>
+              </a:ext>
+            </a:extLst>
+          </p:cNvPr>
+          <p:cNvPicPr>
+            <a:picLocks noChangeAspect="1"/>
+          </p:cNvPicPr>
+          <p:nvPr/>
+        </p:nvPicPr>
+        <p:blipFill>
+          <a:blip r:embed="rId3">
+            <a:extLst>
+              <a:ext uri="{28A0092B-C50C-407E-A947-70E740481C1C}">
+                <a14:useLocalDpi xmlns:a14="http://schemas.microsoft.com/office/drawing/2010/main" val="0"/>
+              </a:ext>
+            </a:extLst>
+          </a:blip>
+          <a:stretch>
+            <a:fillRect/>
+          </a:stretch>
+        </p:blipFill>
+        <p:spPr>
+          <a:xfrm>
+            <a:off x="1358900" y="1690689"/>
+            <a:ext cx="3891880" cy="4351338"/>
+          </a:xfrm>
+          <a:prstGeom prst="rect">
+            <a:avLst/>
+          </a:prstGeom>
+        </p:spPr>
+      </p:pic>
+    </p:spTree>
+    <p:extLst>
+      <p:ext uri="{BB962C8B-B14F-4D97-AF65-F5344CB8AC3E}">
+        <p14:creationId xmlns:p14="http://schemas.microsoft.com/office/powerpoint/2010/main" val="605976454"/>
+      </p:ext>
+    </p:extLst>
+  </p:cSld>
+  <p:clrMapOvr>
+    <a:masterClrMapping/>
+  </p:clrMapOvr>
+</p:sld>
+</file>
+
+<file path=ppt/slides/slide8.xml><?xml version="1.0" encoding="utf-8"?>
+<p:sld xmlns:a="http://schemas.openxmlformats.org/drawingml/2006/main" xmlns:r="http://schemas.openxmlformats.org/officeDocument/2006/relationships" xmlns:p="http://schemas.openxmlformats.org/presentationml/2006/main">
+  <p:cSld>
+    <p:spTree>
+      <p:nvGrpSpPr>
+        <p:cNvPr id="1" name=""/>
+        <p:cNvGrpSpPr/>
+        <p:nvPr/>
+      </p:nvGrpSpPr>
+      <p:grpSpPr>
+        <a:xfrm>
+          <a:off x="0" y="0"/>
+          <a:ext cx="0" cy="0"/>
+          <a:chOff x="0" y="0"/>
+          <a:chExt cx="0" cy="0"/>
+        </a:xfrm>
+      </p:grpSpPr>
+      <p:sp>
+        <p:nvSpPr>
+          <p:cNvPr id="2" name="Title 1">
+            <a:extLst>
+              <a:ext uri="{FF2B5EF4-FFF2-40B4-BE49-F238E27FC236}">
+                <a16:creationId xmlns:a16="http://schemas.microsoft.com/office/drawing/2014/main" id="{C54DE36A-8036-1E6E-6118-8AAB329666E5}"/>
+              </a:ext>
+            </a:extLst>
+          </p:cNvPr>
+          <p:cNvSpPr>
+            <a:spLocks noGrp="1"/>
+          </p:cNvSpPr>
+          <p:nvPr>
+            <p:ph type="title"/>
+          </p:nvPr>
+        </p:nvSpPr>
+        <p:spPr/>
+        <p:txBody>
+          <a:bodyPr/>
+          <a:lstStyle/>
+          <a:p>
+            <a:r>
+              <a:rPr lang="en-US" dirty="0"/>
+              <a:t>Basic Image Manipulation</a:t>
+            </a:r>
+          </a:p>
+        </p:txBody>
+      </p:sp>
+      <p:sp>
+        <p:nvSpPr>
+          <p:cNvPr id="4" name="Content Placeholder 2">
+            <a:extLst>
+              <a:ext uri="{FF2B5EF4-FFF2-40B4-BE49-F238E27FC236}">
+                <a16:creationId xmlns:a16="http://schemas.microsoft.com/office/drawing/2014/main" id="{A14BC6AA-D85D-1D20-B90D-CA59390AF393}"/>
+              </a:ext>
+            </a:extLst>
+          </p:cNvPr>
+          <p:cNvSpPr txBox="1">
+            <a:spLocks/>
+          </p:cNvSpPr>
+          <p:nvPr/>
+        </p:nvSpPr>
+        <p:spPr>
+          <a:xfrm>
+            <a:off x="695696" y="2546927"/>
+            <a:ext cx="10515600" cy="2477799"/>
+          </a:xfrm>
+          <a:prstGeom prst="rect">
+            <a:avLst/>
+          </a:prstGeom>
+        </p:spPr>
+        <p:txBody>
+          <a:bodyPr vert="horz" lIns="91440" tIns="45720" rIns="91440" bIns="45720" rtlCol="0">
+            <a:normAutofit/>
+          </a:bodyPr>
+          <a:lstStyle>
+            <a:lvl1pPr marL="228600" indent="-228600" algn="l" defTabSz="914400" rtl="0" eaLnBrk="1" latinLnBrk="0" hangingPunct="1">
+              <a:lnSpc>
+                <a:spcPct val="90000"/>
+              </a:lnSpc>
+              <a:spcBef>
+                <a:spcPts val="1000"/>
+              </a:spcBef>
+              <a:buFont typeface="Arial" panose="020B0604020202020204" pitchFamily="34" charset="0"/>
+              <a:buChar char="•"/>
+              <a:defRPr sz="2800" kern="1200">
+                <a:solidFill>
+                  <a:schemeClr val="tx1"/>
+                </a:solidFill>
+                <a:latin typeface="+mn-lt"/>
+                <a:ea typeface="+mn-ea"/>
+                <a:cs typeface="+mn-cs"/>
+              </a:defRPr>
+            </a:lvl1pPr>
+            <a:lvl2pPr marL="685800" indent="-228600" algn="l" defTabSz="914400" rtl="0" eaLnBrk="1" latinLnBrk="0" hangingPunct="1">
+              <a:lnSpc>
+                <a:spcPct val="90000"/>
+              </a:lnSpc>
+              <a:spcBef>
+                <a:spcPts val="500"/>
+              </a:spcBef>
+              <a:buFont typeface="Arial" panose="020B0604020202020204" pitchFamily="34" charset="0"/>
+              <a:buChar char="•"/>
+              <a:defRPr sz="2400" kern="1200">
+                <a:solidFill>
+                  <a:schemeClr val="tx1"/>
+                </a:solidFill>
+                <a:latin typeface="+mn-lt"/>
+                <a:ea typeface="+mn-ea"/>
+                <a:cs typeface="+mn-cs"/>
+              </a:defRPr>
+            </a:lvl2pPr>
+            <a:lvl3pPr marL="1143000" indent="-228600" algn="l" defTabSz="914400" rtl="0" eaLnBrk="1" latinLnBrk="0" hangingPunct="1">
+              <a:lnSpc>
+                <a:spcPct val="90000"/>
+              </a:lnSpc>
+              <a:spcBef>
+                <a:spcPts val="500"/>
+              </a:spcBef>
+              <a:buFont typeface="Arial" panose="020B0604020202020204" pitchFamily="34" charset="0"/>
+              <a:buChar char="•"/>
+              <a:defRPr sz="2000" kern="1200">
+                <a:solidFill>
+                  <a:schemeClr val="tx1"/>
+                </a:solidFill>
+                <a:latin typeface="+mn-lt"/>
+                <a:ea typeface="+mn-ea"/>
+                <a:cs typeface="+mn-cs"/>
+              </a:defRPr>
+            </a:lvl3pPr>
+            <a:lvl4pPr marL="1600200" indent="-228600" algn="l" defTabSz="914400" rtl="0" eaLnBrk="1" latinLnBrk="0" hangingPunct="1">
+              <a:lnSpc>
+                <a:spcPct val="90000"/>
+              </a:lnSpc>
+              <a:spcBef>
+                <a:spcPts val="500"/>
+              </a:spcBef>
+              <a:buFont typeface="Arial" panose="020B0604020202020204" pitchFamily="34" charset="0"/>
+              <a:buChar char="•"/>
+              <a:defRPr sz="1800" kern="1200">
+                <a:solidFill>
+                  <a:schemeClr val="tx1"/>
+                </a:solidFill>
+                <a:latin typeface="+mn-lt"/>
+                <a:ea typeface="+mn-ea"/>
+                <a:cs typeface="+mn-cs"/>
+              </a:defRPr>
+            </a:lvl4pPr>
+            <a:lvl5pPr marL="2057400" indent="-228600" algn="l" defTabSz="914400" rtl="0" eaLnBrk="1" latinLnBrk="0" hangingPunct="1">
+              <a:lnSpc>
+                <a:spcPct val="90000"/>
+              </a:lnSpc>
+              <a:spcBef>
+                <a:spcPts val="500"/>
+              </a:spcBef>
+              <a:buFont typeface="Arial" panose="020B0604020202020204" pitchFamily="34" charset="0"/>
+              <a:buChar char="•"/>
+              <a:defRPr sz="1800" kern="1200">
+                <a:solidFill>
+                  <a:schemeClr val="tx1"/>
+                </a:solidFill>
+                <a:latin typeface="+mn-lt"/>
+                <a:ea typeface="+mn-ea"/>
+                <a:cs typeface="+mn-cs"/>
+              </a:defRPr>
+            </a:lvl5pPr>
+            <a:lvl6pPr marL="2514600" indent="-228600" algn="l" defTabSz="914400" rtl="0" eaLnBrk="1" latinLnBrk="0" hangingPunct="1">
+              <a:lnSpc>
+                <a:spcPct val="90000"/>
+              </a:lnSpc>
+              <a:spcBef>
+                <a:spcPts val="500"/>
+              </a:spcBef>
+              <a:buFont typeface="Arial" panose="020B0604020202020204" pitchFamily="34" charset="0"/>
+              <a:buChar char="•"/>
+              <a:defRPr sz="1800" kern="1200">
+                <a:solidFill>
+                  <a:schemeClr val="tx1"/>
+                </a:solidFill>
+                <a:latin typeface="+mn-lt"/>
+                <a:ea typeface="+mn-ea"/>
+                <a:cs typeface="+mn-cs"/>
+              </a:defRPr>
+            </a:lvl6pPr>
+            <a:lvl7pPr marL="2971800" indent="-228600" algn="l" defTabSz="914400" rtl="0" eaLnBrk="1" latinLnBrk="0" hangingPunct="1">
+              <a:lnSpc>
+                <a:spcPct val="90000"/>
+              </a:lnSpc>
+              <a:spcBef>
+                <a:spcPts val="500"/>
+              </a:spcBef>
+              <a:buFont typeface="Arial" panose="020B0604020202020204" pitchFamily="34" charset="0"/>
+              <a:buChar char="•"/>
+              <a:defRPr sz="1800" kern="1200">
+                <a:solidFill>
+                  <a:schemeClr val="tx1"/>
+                </a:solidFill>
+                <a:latin typeface="+mn-lt"/>
+                <a:ea typeface="+mn-ea"/>
+                <a:cs typeface="+mn-cs"/>
+              </a:defRPr>
+            </a:lvl7pPr>
+            <a:lvl8pPr marL="3429000" indent="-228600" algn="l" defTabSz="914400" rtl="0" eaLnBrk="1" latinLnBrk="0" hangingPunct="1">
+              <a:lnSpc>
+                <a:spcPct val="90000"/>
+              </a:lnSpc>
+              <a:spcBef>
+                <a:spcPts val="500"/>
+              </a:spcBef>
+              <a:buFont typeface="Arial" panose="020B0604020202020204" pitchFamily="34" charset="0"/>
+              <a:buChar char="•"/>
+              <a:defRPr sz="1800" kern="1200">
+                <a:solidFill>
+                  <a:schemeClr val="tx1"/>
+                </a:solidFill>
+                <a:latin typeface="+mn-lt"/>
+                <a:ea typeface="+mn-ea"/>
+                <a:cs typeface="+mn-cs"/>
+              </a:defRPr>
+            </a:lvl8pPr>
+            <a:lvl9pPr marL="3886200" indent="-228600" algn="l" defTabSz="914400" rtl="0" eaLnBrk="1" latinLnBrk="0" hangingPunct="1">
+              <a:lnSpc>
+                <a:spcPct val="90000"/>
+              </a:lnSpc>
+              <a:spcBef>
+                <a:spcPts val="500"/>
+              </a:spcBef>
+              <a:buFont typeface="Arial" panose="020B0604020202020204" pitchFamily="34" charset="0"/>
+              <a:buChar char="•"/>
+              <a:defRPr sz="1800" kern="1200">
+                <a:solidFill>
+                  <a:schemeClr val="tx1"/>
+                </a:solidFill>
+                <a:latin typeface="+mn-lt"/>
+                <a:ea typeface="+mn-ea"/>
+                <a:cs typeface="+mn-cs"/>
+              </a:defRPr>
+            </a:lvl9pPr>
+          </a:lstStyle>
+          <a:p>
+            <a:pPr marL="0" indent="0" algn="ctr">
+              <a:buFont typeface="Arial" panose="020B0604020202020204" pitchFamily="34" charset="0"/>
+              <a:buNone/>
+            </a:pPr>
+            <a:r>
+              <a:rPr lang="en-US" sz="16600"/>
+              <a:t>DEMO</a:t>
+            </a:r>
+            <a:endParaRPr lang="en-US" sz="16600" dirty="0"/>
+          </a:p>
+        </p:txBody>
+      </p:sp>
+    </p:spTree>
+    <p:extLst>
+      <p:ext uri="{BB962C8B-B14F-4D97-AF65-F5344CB8AC3E}">
+        <p14:creationId xmlns:p14="http://schemas.microsoft.com/office/powerpoint/2010/main" val="762367994"/>
+      </p:ext>
+    </p:extLst>
+  </p:cSld>
+  <p:clrMapOvr>
+    <a:masterClrMapping/>
+  </p:clrMapOvr>
+</p:sld>
+</file>
+
+<file path=ppt/slides/slide9.xml><?xml version="1.0" encoding="utf-8"?>
+<p:sld xmlns:a="http://schemas.openxmlformats.org/drawingml/2006/main" xmlns:r="http://schemas.openxmlformats.org/officeDocument/2006/relationships" xmlns:p="http://schemas.openxmlformats.org/presentationml/2006/main">
+  <p:cSld>
+    <p:spTree>
+      <p:nvGrpSpPr>
+        <p:cNvPr id="1" name=""/>
+        <p:cNvGrpSpPr/>
+        <p:nvPr/>
+      </p:nvGrpSpPr>
+      <p:grpSpPr>
+        <a:xfrm>
+          <a:off x="0" y="0"/>
+          <a:ext cx="0" cy="0"/>
+          <a:chOff x="0" y="0"/>
+          <a:chExt cx="0" cy="0"/>
+        </a:xfrm>
+      </p:grpSpPr>
+      <p:sp>
+        <p:nvSpPr>
+          <p:cNvPr id="2" name="Title 1">
+            <a:extLst>
+              <a:ext uri="{FF2B5EF4-FFF2-40B4-BE49-F238E27FC236}">
+                <a16:creationId xmlns:a16="http://schemas.microsoft.com/office/drawing/2014/main" id="{259BEC9A-0E2E-A548-AB21-8440257A2212}"/>
+              </a:ext>
+            </a:extLst>
+          </p:cNvPr>
+          <p:cNvSpPr>
+            <a:spLocks noGrp="1"/>
+          </p:cNvSpPr>
+          <p:nvPr>
+            <p:ph type="title"/>
+          </p:nvPr>
+        </p:nvSpPr>
+        <p:spPr/>
+        <p:txBody>
+          <a:bodyPr/>
+          <a:lstStyle/>
+          <a:p>
+            <a:r>
+              <a:rPr lang="en-US"/>
+              <a:t>Python Libraries for Image Processing</a:t>
+            </a:r>
+            <a:endParaRPr lang="en-US" dirty="0"/>
+          </a:p>
+        </p:txBody>
+      </p:sp>
+      <p:graphicFrame>
+        <p:nvGraphicFramePr>
+          <p:cNvPr id="4" name="Table 4">
+            <a:extLst>
+              <a:ext uri="{FF2B5EF4-FFF2-40B4-BE49-F238E27FC236}">
+                <a16:creationId xmlns:a16="http://schemas.microsoft.com/office/drawing/2014/main" id="{37537F46-9142-7871-4FAE-D1B273249B50}"/>
+              </a:ext>
+            </a:extLst>
+          </p:cNvPr>
+          <p:cNvGraphicFramePr>
+            <a:graphicFrameLocks noGrp="1"/>
+          </p:cNvGraphicFramePr>
+          <p:nvPr>
+            <p:extLst>
+              <p:ext uri="{D42A27DB-BD31-4B8C-83A1-F6EECF244321}">
+                <p14:modId xmlns:p14="http://schemas.microsoft.com/office/powerpoint/2010/main" val="695972116"/>
+              </p:ext>
+            </p:extLst>
+          </p:nvPr>
+        </p:nvGraphicFramePr>
+        <p:xfrm>
+          <a:off x="1608975" y="2564396"/>
+          <a:ext cx="8974050" cy="2316480"/>
+        </p:xfrm>
+        <a:graphic>
+          <a:graphicData uri="http://schemas.openxmlformats.org/drawingml/2006/table">
+            <a:tbl>
+              <a:tblPr firstRow="1" bandRow="1">
+                <a:tableStyleId>{5C22544A-7EE6-4342-B048-85BDC9FD1C3A}</a:tableStyleId>
+              </a:tblPr>
+              <a:tblGrid>
+                <a:gridCol w="2991350">
+                  <a:extLst>
+                    <a:ext uri="{9D8B030D-6E8A-4147-A177-3AD203B41FA5}">
+                      <a16:colId xmlns:a16="http://schemas.microsoft.com/office/drawing/2014/main" val="499050389"/>
+                    </a:ext>
+                  </a:extLst>
+                </a:gridCol>
+                <a:gridCol w="2991350">
+                  <a:extLst>
+                    <a:ext uri="{9D8B030D-6E8A-4147-A177-3AD203B41FA5}">
+                      <a16:colId xmlns:a16="http://schemas.microsoft.com/office/drawing/2014/main" val="1264277190"/>
+                    </a:ext>
+                  </a:extLst>
+                </a:gridCol>
+                <a:gridCol w="2991350">
+                  <a:extLst>
+                    <a:ext uri="{9D8B030D-6E8A-4147-A177-3AD203B41FA5}">
+                      <a16:colId xmlns:a16="http://schemas.microsoft.com/office/drawing/2014/main" val="300104439"/>
+                    </a:ext>
+                  </a:extLst>
+                </a:gridCol>
+              </a:tblGrid>
+              <a:tr h="370840">
+                <a:tc>
+                  <a:txBody>
+                    <a:bodyPr/>
+                    <a:lstStyle/>
+                    <a:p>
+                      <a:endParaRPr lang="en-US" sz="3200" dirty="0"/>
+                    </a:p>
+                  </a:txBody>
+                  <a:tcPr/>
+                </a:tc>
+                <a:tc>
+                  <a:txBody>
+                    <a:bodyPr/>
+                    <a:lstStyle/>
+                    <a:p>
+                      <a:r>
+                        <a:rPr lang="en-US" sz="3200" dirty="0"/>
+                        <a:t>Scikit-Image</a:t>
+                      </a:r>
+                    </a:p>
+                  </a:txBody>
+                  <a:tcPr/>
+                </a:tc>
+                <a:tc>
+                  <a:txBody>
+                    <a:bodyPr/>
+                    <a:lstStyle/>
+                    <a:p>
+                      <a:r>
+                        <a:rPr lang="en-US" sz="3200" dirty="0"/>
+                        <a:t>OpenCV</a:t>
+                      </a:r>
+                    </a:p>
+                  </a:txBody>
+                  <a:tcPr/>
+                </a:tc>
+                <a:extLst>
+                  <a:ext uri="{0D108BD9-81ED-4DB2-BD59-A6C34878D82A}">
+                    <a16:rowId xmlns:a16="http://schemas.microsoft.com/office/drawing/2014/main" val="4130853037"/>
+                  </a:ext>
+                </a:extLst>
+              </a:tr>
+              <a:tr h="370840">
+                <a:tc>
+                  <a:txBody>
+                    <a:bodyPr/>
+                    <a:lstStyle/>
+                    <a:p>
+                      <a:r>
+                        <a:rPr lang="en-US" sz="3200" dirty="0"/>
+                        <a:t>Speed</a:t>
+                      </a:r>
+                    </a:p>
+                  </a:txBody>
+                  <a:tcPr/>
+                </a:tc>
+                <a:tc>
+                  <a:txBody>
+                    <a:bodyPr/>
+                    <a:lstStyle/>
+                    <a:p>
+                      <a:r>
+                        <a:rPr lang="en-US" sz="3200" dirty="0"/>
+                        <a:t>Slow</a:t>
+                      </a:r>
+                    </a:p>
+                  </a:txBody>
+                  <a:tcPr/>
+                </a:tc>
+                <a:tc>
+                  <a:txBody>
+                    <a:bodyPr/>
+                    <a:lstStyle/>
+                    <a:p>
+                      <a:r>
+                        <a:rPr lang="en-US" sz="3200" dirty="0"/>
+                        <a:t>Fast</a:t>
+                      </a:r>
+                    </a:p>
+                  </a:txBody>
+                  <a:tcPr/>
+                </a:tc>
+                <a:extLst>
+                  <a:ext uri="{0D108BD9-81ED-4DB2-BD59-A6C34878D82A}">
+                    <a16:rowId xmlns:a16="http://schemas.microsoft.com/office/drawing/2014/main" val="2712355243"/>
+                  </a:ext>
+                </a:extLst>
+              </a:tr>
+              <a:tr h="370840">
+                <a:tc>
+                  <a:txBody>
+                    <a:bodyPr/>
+                    <a:lstStyle/>
+                    <a:p>
+                      <a:r>
+                        <a:rPr lang="en-US" sz="3200" dirty="0"/>
+                        <a:t>Documentation</a:t>
+                      </a:r>
+                    </a:p>
+                  </a:txBody>
+                  <a:tcPr/>
+                </a:tc>
+                <a:tc>
+                  <a:txBody>
+                    <a:bodyPr/>
+                    <a:lstStyle/>
+                    <a:p>
+                      <a:r>
+                        <a:rPr lang="en-US" sz="3200" dirty="0"/>
+                        <a:t>Good</a:t>
+                      </a:r>
+                    </a:p>
+                  </a:txBody>
+                  <a:tcPr/>
+                </a:tc>
+                <a:tc>
+                  <a:txBody>
+                    <a:bodyPr/>
+                    <a:lstStyle/>
+                    <a:p>
+                      <a:r>
+                        <a:rPr lang="en-US" sz="3200" dirty="0"/>
+                        <a:t>Bad</a:t>
+                      </a:r>
+                    </a:p>
+                  </a:txBody>
+                  <a:tcPr/>
+                </a:tc>
+                <a:extLst>
+                  <a:ext uri="{0D108BD9-81ED-4DB2-BD59-A6C34878D82A}">
+                    <a16:rowId xmlns:a16="http://schemas.microsoft.com/office/drawing/2014/main" val="36617547"/>
+                  </a:ext>
+                </a:extLst>
+              </a:tr>
+              <a:tr h="370840">
+                <a:tc>
+                  <a:txBody>
+                    <a:bodyPr/>
+                    <a:lstStyle/>
+                    <a:p>
+                      <a:r>
+                        <a:rPr lang="en-US" sz="3200" dirty="0"/>
+                        <a:t>Datatype</a:t>
+                      </a:r>
+                    </a:p>
+                  </a:txBody>
+                  <a:tcPr/>
+                </a:tc>
+                <a:tc>
+                  <a:txBody>
+                    <a:bodyPr/>
+                    <a:lstStyle/>
+                    <a:p>
+                      <a:r>
+                        <a:rPr lang="en-US" sz="3200" dirty="0"/>
+                        <a:t>float</a:t>
+                      </a:r>
+                    </a:p>
+                  </a:txBody>
+                  <a:tcPr/>
+                </a:tc>
+                <a:tc>
+                  <a:txBody>
+                    <a:bodyPr/>
+                    <a:lstStyle/>
+                    <a:p>
+                      <a:r>
+                        <a:rPr lang="en-US" sz="3200" dirty="0"/>
+                        <a:t>uint8</a:t>
+                      </a:r>
+                    </a:p>
+                  </a:txBody>
+                  <a:tcPr/>
+                </a:tc>
+                <a:extLst>
+                  <a:ext uri="{0D108BD9-81ED-4DB2-BD59-A6C34878D82A}">
+                    <a16:rowId xmlns:a16="http://schemas.microsoft.com/office/drawing/2014/main" val="1702374622"/>
+                  </a:ext>
+                </a:extLst>
+              </a:tr>
+            </a:tbl>
+          </a:graphicData>
+        </a:graphic>
+      </p:graphicFrame>
+    </p:spTree>
+    <p:extLst>
+      <p:ext uri="{BB962C8B-B14F-4D97-AF65-F5344CB8AC3E}">
+        <p14:creationId xmlns:p14="http://schemas.microsoft.com/office/powerpoint/2010/main" val="3715475716"/>
+      </p:ext>
+    </p:extLst>
+  </p:cSld>
+  <p:clrMapOvr>
+    <a:masterClrMapping/>
+  </p:clrMapOvr>
+</p:sld>
+</file>
+
 <file path=ppt/theme/theme1.xml><?xml version="1.0" encoding="utf-8"?>
 <a:theme xmlns:a="http://schemas.openxmlformats.org/drawingml/2006/main" name="Office Theme">
   <a:themeElements>

</xml_diff>

<commit_message>
update day 2 pptx
</commit_message>
<xml_diff>
--- a/day_2/day_2.pptx
+++ b/day_2/day_2.pptx
@@ -3416,7 +3416,7 @@
           <a:p>
             <a:r>
               <a:rPr lang="en-US" sz="3600" dirty="0"/>
-              <a:t>10/23/2023</a:t>
+              <a:t>10/25/2023</a:t>
             </a:r>
           </a:p>
           <a:p>
@@ -3730,7 +3730,7 @@
             </a:br>
             <a:r>
               <a:rPr lang="en-US" dirty="0"/>
-              <a:t>Images are numbers</a:t>
+              <a:t>Images are numbers (Array of numbers)</a:t>
             </a:r>
           </a:p>
         </p:txBody>
@@ -5141,6 +5141,13 @@
           <a:bodyPr/>
           <a:lstStyle/>
           <a:p>
+            <a:r>
+              <a:rPr lang="en-US"/>
+              <a:t>Conclusion:</a:t>
+            </a:r>
+            <a:br>
+              <a:rPr lang="en-US"/>
+            </a:br>
             <a:r>
               <a:rPr lang="en-US"/>
               <a:t>Python Libraries for Image Processing</a:t>

</xml_diff>